<commit_message>
Add PPPQ Power BI Summit quiz and extra questions
</commit_message>
<xml_diff>
--- a/Quiz 1.pptx
+++ b/Quiz 1.pptx
@@ -255,18 +255,32 @@
 </p:cmAuthorLst>
 </file>
 
-<file path=ppt/revisionInfo.xml><?xml version="1.0" encoding="utf-8"?>
-<p1510:revInfo xmlns:a="http://schemas.openxmlformats.org/drawingml/2006/main" xmlns:r="http://schemas.openxmlformats.org/officeDocument/2006/relationships" xmlns:p1510="http://schemas.microsoft.com/office/powerpoint/2015/10/main">
-  <p1510:revLst>
-    <p1510:client id="{3A74AA4F-E3E5-4FB2-805F-E334186E1A9B}" v="680" dt="2021-03-27T22:49:15.835"/>
-    <p1510:client id="{A3C5F80A-3740-458F-8865-A8DB15906532}" v="205" dt="2021-03-27T03:32:53.688"/>
-    <p1510:client id="{B388006A-4A2D-43AC-B1B4-E5A8F6E429E3}" v="2" dt="2021-03-27T01:40:02.366"/>
-  </p1510:revLst>
-</p1510:revInfo>
-</file>
-
 <file path=ppt/changesInfos/changesInfo1.xml><?xml version="1.0" encoding="utf-8"?>
 <pc:chgInfo xmlns:a="http://schemas.openxmlformats.org/drawingml/2006/main" xmlns:r="http://schemas.openxmlformats.org/officeDocument/2006/relationships" xmlns:ac="http://schemas.microsoft.com/office/drawing/2013/main/command" xmlns:pc="http://schemas.microsoft.com/office/powerpoint/2013/main/command">
+  <pc:docChgLst>
+    <pc:chgData name="Greg Nash" userId="b0e183b134c36057" providerId="LiveId" clId="{258130A1-7B50-4B83-A594-318292BE779A}"/>
+    <pc:docChg chg="modSld">
+      <pc:chgData name="Greg Nash" userId="b0e183b134c36057" providerId="LiveId" clId="{258130A1-7B50-4B83-A594-318292BE779A}" dt="2021-04-19T05:21:01.845" v="14" actId="20577"/>
+      <pc:docMkLst>
+        <pc:docMk/>
+      </pc:docMkLst>
+      <pc:sldChg chg="modSp mod">
+        <pc:chgData name="Greg Nash" userId="b0e183b134c36057" providerId="LiveId" clId="{258130A1-7B50-4B83-A594-318292BE779A}" dt="2021-04-19T05:21:01.845" v="14" actId="20577"/>
+        <pc:sldMkLst>
+          <pc:docMk/>
+          <pc:sldMk cId="1666704521" sldId="9031"/>
+        </pc:sldMkLst>
+        <pc:spChg chg="mod">
+          <ac:chgData name="Greg Nash" userId="b0e183b134c36057" providerId="LiveId" clId="{258130A1-7B50-4B83-A594-318292BE779A}" dt="2021-04-19T05:21:01.845" v="14" actId="20577"/>
+          <ac:spMkLst>
+            <pc:docMk/>
+            <pc:sldMk cId="1666704521" sldId="9031"/>
+            <ac:spMk id="13" creationId="{F275F0A6-9823-4523-80C0-6DD4E1799FCE}"/>
+          </ac:spMkLst>
+        </pc:spChg>
+      </pc:sldChg>
+    </pc:docChg>
+  </pc:docChgLst>
   <pc:docChgLst>
     <pc:chgData name="Greg Nash" userId="be3fdb2b-dfd1-4e7d-bf98-732a3c13d47d" providerId="ADAL" clId="{3A74AA4F-E3E5-4FB2-805F-E334186E1A9B}"/>
     <pc:docChg chg="undo custSel addSld delSld modSld sldOrd modMainMaster modSection modNotesMaster">
@@ -7651,7 +7665,7 @@
           <a:p>
             <a:fld id="{0F50EB7A-11AD-43E6-8B81-E43E3DF93755}" type="datetimeFigureOut">
               <a:rPr lang="en-AU" smtClean="0"/>
-              <a:t>28/03/2021</a:t>
+              <a:t>19/04/2021</a:t>
             </a:fld>
             <a:endParaRPr lang="en-AU"/>
           </a:p>
@@ -7828,7 +7842,7 @@
           <a:p>
             <a:fld id="{2480AFE7-3CC7-40B3-93A9-03A17F757818}" type="datetimeFigureOut">
               <a:rPr lang="en-AU" smtClean="0"/>
-              <a:t>28/03/2021</a:t>
+              <a:t>19/04/2021</a:t>
             </a:fld>
             <a:endParaRPr lang="en-AU"/>
           </a:p>
@@ -22042,7 +22056,7 @@
           <a:p>
             <a:fld id="{C764DE79-268F-4C1A-8933-263129D2AF90}" type="datetimeFigureOut">
               <a:rPr lang="en-US" smtClean="0"/>
-              <a:t>3/28/2021</a:t>
+              <a:t>4/19/2021</a:t>
             </a:fld>
             <a:endParaRPr lang="en-US"/>
           </a:p>
@@ -22247,7 +22261,7 @@
           <a:p>
             <a:fld id="{C764DE79-268F-4C1A-8933-263129D2AF90}" type="datetimeFigureOut">
               <a:rPr lang="en-US" smtClean="0"/>
-              <a:t>3/28/2021</a:t>
+              <a:t>4/19/2021</a:t>
             </a:fld>
             <a:endParaRPr lang="en-US"/>
           </a:p>
@@ -22425,7 +22439,7 @@
           <a:p>
             <a:fld id="{C764DE79-268F-4C1A-8933-263129D2AF90}" type="datetimeFigureOut">
               <a:rPr lang="en-US" smtClean="0"/>
-              <a:t>3/28/2021</a:t>
+              <a:t>4/19/2021</a:t>
             </a:fld>
             <a:endParaRPr lang="en-US"/>
           </a:p>
@@ -24168,7 +24182,7 @@
           <a:p>
             <a:fld id="{C764DE79-268F-4C1A-8933-263129D2AF90}" type="datetimeFigureOut">
               <a:rPr lang="en-US" smtClean="0"/>
-              <a:t>3/28/2021</a:t>
+              <a:t>4/19/2021</a:t>
             </a:fld>
             <a:endParaRPr lang="en-US"/>
           </a:p>
@@ -33065,7 +33079,7 @@
           <a:p>
             <a:fld id="{C764DE79-268F-4C1A-8933-263129D2AF90}" type="datetimeFigureOut">
               <a:rPr lang="en-US" smtClean="0"/>
-              <a:t>3/28/2021</a:t>
+              <a:t>4/19/2021</a:t>
             </a:fld>
             <a:endParaRPr lang="en-US"/>
           </a:p>
@@ -33336,7 +33350,7 @@
           <a:p>
             <a:fld id="{C764DE79-268F-4C1A-8933-263129D2AF90}" type="datetimeFigureOut">
               <a:rPr lang="en-US" smtClean="0"/>
-              <a:t>3/28/2021</a:t>
+              <a:t>4/19/2021</a:t>
             </a:fld>
             <a:endParaRPr lang="en-US"/>
           </a:p>
@@ -33731,7 +33745,7 @@
           <a:p>
             <a:fld id="{C764DE79-268F-4C1A-8933-263129D2AF90}" type="datetimeFigureOut">
               <a:rPr lang="en-US" smtClean="0"/>
-              <a:t>3/28/2021</a:t>
+              <a:t>4/19/2021</a:t>
             </a:fld>
             <a:endParaRPr lang="en-US"/>
           </a:p>
@@ -33848,7 +33862,7 @@
           <a:p>
             <a:fld id="{C764DE79-268F-4C1A-8933-263129D2AF90}" type="datetimeFigureOut">
               <a:rPr lang="en-US" smtClean="0"/>
-              <a:t>3/28/2021</a:t>
+              <a:t>4/19/2021</a:t>
             </a:fld>
             <a:endParaRPr lang="en-US"/>
           </a:p>
@@ -33943,7 +33957,7 @@
           <a:p>
             <a:fld id="{C764DE79-268F-4C1A-8933-263129D2AF90}" type="datetimeFigureOut">
               <a:rPr lang="en-US" smtClean="0"/>
-              <a:t>3/28/2021</a:t>
+              <a:t>4/19/2021</a:t>
             </a:fld>
             <a:endParaRPr lang="en-US"/>
           </a:p>
@@ -34231,7 +34245,7 @@
           <a:p>
             <a:fld id="{C764DE79-268F-4C1A-8933-263129D2AF90}" type="datetimeFigureOut">
               <a:rPr lang="en-US" smtClean="0"/>
-              <a:t>3/28/2021</a:t>
+              <a:t>4/19/2021</a:t>
             </a:fld>
             <a:endParaRPr lang="en-US"/>
           </a:p>
@@ -34509,7 +34523,7 @@
           <a:p>
             <a:fld id="{C764DE79-268F-4C1A-8933-263129D2AF90}" type="datetimeFigureOut">
               <a:rPr lang="en-US" smtClean="0"/>
-              <a:t>3/28/2021</a:t>
+              <a:t>4/19/2021</a:t>
             </a:fld>
             <a:endParaRPr lang="en-US"/>
           </a:p>
@@ -34757,7 +34771,7 @@
           <a:p>
             <a:fld id="{C764DE79-268F-4C1A-8933-263129D2AF90}" type="datetimeFigureOut">
               <a:rPr lang="en-US" smtClean="0"/>
-              <a:t>3/28/2021</a:t>
+              <a:t>4/19/2021</a:t>
             </a:fld>
             <a:endParaRPr lang="en-US"/>
           </a:p>
@@ -35485,16 +35499,16 @@
           <a:p>
             <a:pPr algn="ctr"/>
             <a:r>
-              <a:rPr lang="en-US" sz="4800" b="1" i="1">
+              <a:rPr lang="en-US" sz="4800" b="1" i="1" dirty="0">
                 <a:solidFill>
                   <a:srgbClr val="FFC000"/>
                 </a:solidFill>
                 <a:latin typeface="Gotham Pro" panose="02000503040000020004" pitchFamily="50" charset="0"/>
                 <a:cs typeface="Gotham Pro" panose="02000503040000020004" pitchFamily="50" charset="0"/>
               </a:rPr>
-              <a:t>#MVP EDITION</a:t>
+              <a:t>#POWER BI SUMMIT</a:t>
             </a:r>
-            <a:endParaRPr lang="en-AU" sz="2000" b="1">
+            <a:endParaRPr lang="en-AU" sz="2000" b="1" dirty="0">
               <a:solidFill>
                 <a:srgbClr val="FFC000"/>
               </a:solidFill>
@@ -49914,12 +49928,6 @@
 </file>
 
 <file path=customXml/item1.xml><?xml version="1.0" encoding="utf-8"?>
-<p:properties xmlns:p="http://schemas.microsoft.com/office/2006/metadata/properties" xmlns:xsi="http://www.w3.org/2001/XMLSchema-instance" xmlns:pc="http://schemas.microsoft.com/office/infopath/2007/PartnerControls">
-  <documentManagement/>
-</p:properties>
-</file>
-
-<file path=customXml/item2.xml><?xml version="1.0" encoding="utf-8"?>
 <ct:contentTypeSchema xmlns:ct="http://schemas.microsoft.com/office/2006/metadata/contentType" xmlns:ma="http://schemas.microsoft.com/office/2006/metadata/properties/metaAttributes" ct:_="" ma:_="" ma:contentTypeName="Document" ma:contentTypeID="0x010100B5AC499299398148A95C7E07787A3991" ma:contentTypeVersion="5" ma:contentTypeDescription="Create a new document." ma:contentTypeScope="" ma:versionID="b1e80aa610614040450f27dc5727ffca">
   <xsd:schema xmlns:xsd="http://www.w3.org/2001/XMLSchema" xmlns:xs="http://www.w3.org/2001/XMLSchema" xmlns:p="http://schemas.microsoft.com/office/2006/metadata/properties" xmlns:ns2="0c8fbd91-8d19-44e5-b61f-5f0738998dac" targetNamespace="http://schemas.microsoft.com/office/2006/metadata/properties" ma:root="true" ma:fieldsID="32cfad352f73452ce218b7ec969be4c1" ns2:_="">
     <xsd:import namespace="0c8fbd91-8d19-44e5-b61f-5f0738998dac"/>
@@ -50069,7 +50077,7 @@
 </ct:contentTypeSchema>
 </file>
 
-<file path=customXml/item3.xml><?xml version="1.0" encoding="utf-8"?>
+<file path=customXml/item2.xml><?xml version="1.0" encoding="utf-8"?>
 <?mso-contentType ?>
 <FormTemplates xmlns="http://schemas.microsoft.com/sharepoint/v3/contenttype/forms">
   <Display>DocumentLibraryForm</Display>
@@ -50078,24 +50086,13 @@
 </FormTemplates>
 </file>
 
-<file path=customXml/itemProps1.xml><?xml version="1.0" encoding="utf-8"?>
-<ds:datastoreItem xmlns:ds="http://schemas.openxmlformats.org/officeDocument/2006/customXml" ds:itemID="{BAB4497C-BF01-4780-9D59-5B4BEC09C3CC}">
-  <ds:schemaRefs>
-    <ds:schemaRef ds:uri="8012b806-e2ca-4c42-918e-8c4b4856c365"/>
-    <ds:schemaRef ds:uri="ecda84d4-3ea6-47da-8c8d-ff44d159a565"/>
-    <ds:schemaRef ds:uri="http://purl.org/dc/dcmitype/"/>
-    <ds:schemaRef ds:uri="http://purl.org/dc/elements/1.1/"/>
-    <ds:schemaRef ds:uri="http://purl.org/dc/terms/"/>
-    <ds:schemaRef ds:uri="http://schemas.microsoft.com/office/2006/documentManagement/types"/>
-    <ds:schemaRef ds:uri="http://schemas.microsoft.com/office/2006/metadata/properties"/>
-    <ds:schemaRef ds:uri="http://schemas.microsoft.com/office/infopath/2007/PartnerControls"/>
-    <ds:schemaRef ds:uri="http://schemas.openxmlformats.org/package/2006/metadata/core-properties"/>
-    <ds:schemaRef ds:uri="http://www.w3.org/XML/1998/namespace"/>
-  </ds:schemaRefs>
-</ds:datastoreItem>
+<file path=customXml/item3.xml><?xml version="1.0" encoding="utf-8"?>
+<p:properties xmlns:p="http://schemas.microsoft.com/office/2006/metadata/properties" xmlns:xsi="http://www.w3.org/2001/XMLSchema-instance" xmlns:pc="http://schemas.microsoft.com/office/infopath/2007/PartnerControls">
+  <documentManagement/>
+</p:properties>
 </file>
 
-<file path=customXml/itemProps2.xml><?xml version="1.0" encoding="utf-8"?>
+<file path=customXml/itemProps1.xml><?xml version="1.0" encoding="utf-8"?>
 <ds:datastoreItem xmlns:ds="http://schemas.openxmlformats.org/officeDocument/2006/customXml" ds:itemID="{12225893-954C-4DF4-8AE9-5DDA828F98F7}">
   <ds:schemaRefs>
     <ds:schemaRef ds:uri="0c8fbd91-8d19-44e5-b61f-5f0738998dac"/>
@@ -50113,10 +50110,27 @@
 </ds:datastoreItem>
 </file>
 
-<file path=customXml/itemProps3.xml><?xml version="1.0" encoding="utf-8"?>
+<file path=customXml/itemProps2.xml><?xml version="1.0" encoding="utf-8"?>
 <ds:datastoreItem xmlns:ds="http://schemas.openxmlformats.org/officeDocument/2006/customXml" ds:itemID="{69282AEE-6E56-447B-AB8F-84B386C1CBBB}">
   <ds:schemaRefs>
     <ds:schemaRef ds:uri="http://schemas.microsoft.com/sharepoint/v3/contenttype/forms"/>
   </ds:schemaRefs>
 </ds:datastoreItem>
+</file>
+
+<file path=customXml/itemProps3.xml><?xml version="1.0" encoding="utf-8"?>
+<ds:datastoreItem xmlns:ds="http://schemas.openxmlformats.org/officeDocument/2006/customXml" ds:itemID="{BAB4497C-BF01-4780-9D59-5B4BEC09C3CC}">
+  <ds:schemaRefs>
+    <ds:schemaRef ds:uri="8012b806-e2ca-4c42-918e-8c4b4856c365"/>
+    <ds:schemaRef ds:uri="ecda84d4-3ea6-47da-8c8d-ff44d159a565"/>
+    <ds:schemaRef ds:uri="http://purl.org/dc/dcmitype/"/>
+    <ds:schemaRef ds:uri="http://purl.org/dc/elements/1.1/"/>
+    <ds:schemaRef ds:uri="http://purl.org/dc/terms/"/>
+    <ds:schemaRef ds:uri="http://schemas.microsoft.com/office/2006/documentManagement/types"/>
+    <ds:schemaRef ds:uri="http://schemas.microsoft.com/office/2006/metadata/properties"/>
+    <ds:schemaRef ds:uri="http://schemas.microsoft.com/office/infopath/2007/PartnerControls"/>
+    <ds:schemaRef ds:uri="http://schemas.openxmlformats.org/package/2006/metadata/core-properties"/>
+    <ds:schemaRef ds:uri="http://www.w3.org/XML/1998/namespace"/>
+  </ds:schemaRefs>
+</ds:datastoreItem>
 </file>
</xml_diff>